<commit_message>
Final Submission for group2
</commit_message>
<xml_diff>
--- a/presentation/Project_one.pptx
+++ b/presentation/Project_one.pptx
@@ -252,7 +252,7 @@
             <a:fld id="{EFC10EE1-B198-C942-8235-326C972CBB30}" type="datetimeFigureOut">
               <a:rPr lang="en-US" smtClean="0"/>
               <a:pPr/>
-              <a:t>4/27/2021</a:t>
+              <a:t>4/28/2021</a:t>
             </a:fld>
             <a:endParaRPr lang="en-US" dirty="0"/>
           </a:p>
@@ -3011,8 +3011,8 @@
         </p:nvSpPr>
         <p:spPr>
           <a:xfrm>
-            <a:off x="7917401" y="7919829"/>
-            <a:ext cx="8641666" cy="1138776"/>
+            <a:off x="7665025" y="7919829"/>
+            <a:ext cx="9146420" cy="1148523"/>
           </a:xfrm>
           <a:prstGeom prst="rect">
             <a:avLst/>
@@ -3217,7 +3217,7 @@
                 <a:ea typeface="Open Sans Light" charset="0"/>
                 <a:cs typeface="Open Sans Light" charset="0"/>
               </a:rPr>
-              <a:t>Tarak Patel, Nicole Lund, Anne Niemiec</a:t>
+              <a:t>Tarak Patel, Nicole Lund &amp; Anne Niemiec</a:t>
             </a:r>
           </a:p>
         </p:txBody>
@@ -3296,15 +3296,6 @@
               </a:rPr>
               <a:t>Health Data </a:t>
             </a:r>
-            <a:endParaRPr lang="en-US" sz="6000" spc="3500" dirty="0">
-              <a:solidFill>
-                <a:schemeClr val="bg1"/>
-              </a:solidFill>
-              <a:latin typeface="Open Sans Light" charset="0"/>
-              <a:ea typeface="Open Sans Light" charset="0"/>
-              <a:cs typeface="Open Sans Light" charset="0"/>
-              <a:sym typeface="Bebas Neue" charset="0"/>
-            </a:endParaRPr>
           </a:p>
         </p:txBody>
       </p:sp>
@@ -3320,7 +3311,7 @@
   </p:clrMapOvr>
   <mc:AlternateContent xmlns:mc="http://schemas.openxmlformats.org/markup-compatibility/2006" xmlns:p14="http://schemas.microsoft.com/office/powerpoint/2010/main">
     <mc:Choice Requires="p14">
-      <p:transition p14:dur="0" advClick="0"/>
+      <p:transition p14:dur="10" advClick="0"/>
     </mc:Choice>
     <mc:Fallback xmlns="">
       <p:transition advClick="0"/>
@@ -3816,8 +3807,8 @@
         </p:nvSpPr>
         <p:spPr>
           <a:xfrm>
-            <a:off x="1515035" y="11217105"/>
-            <a:ext cx="2303836" cy="461665"/>
+            <a:off x="1515036" y="11217105"/>
+            <a:ext cx="21970186" cy="769441"/>
           </a:xfrm>
           <a:prstGeom prst="rect">
             <a:avLst/>
@@ -3825,7 +3816,7 @@
           <a:noFill/>
         </p:spPr>
         <p:txBody>
-          <a:bodyPr wrap="none" rtlCol="0">
+          <a:bodyPr wrap="square" rtlCol="0">
             <a:spAutoFit/>
           </a:bodyPr>
           <a:lstStyle/>
@@ -3837,6 +3828,24 @@
                 <a:cs typeface="Open Sans" panose="020B0606030504020204" pitchFamily="34" charset="0"/>
               </a:rPr>
               <a:t>Commentary:  </a:t>
+            </a:r>
+            <a:r>
+              <a:rPr lang="en-US" sz="2000" b="0" i="0" dirty="0">
+                <a:solidFill>
+                  <a:srgbClr val="000000"/>
+                </a:solidFill>
+                <a:effectLst/>
+                <a:latin typeface="Consolas" panose="020B0609020204030204" pitchFamily="49" charset="0"/>
+              </a:rPr>
+              <a:t>In this figure, the states are NOT normalized by population, therefore, it reflects a higher number of allocation for states including CA, FL, TX) that have a high population value.</a:t>
+            </a:r>
+            <a:r>
+              <a:rPr lang="en-US" sz="2000" dirty="0">
+                <a:latin typeface="Open Sans" panose="020B0606030504020204" pitchFamily="34" charset="0"/>
+                <a:ea typeface="Open Sans" panose="020B0606030504020204" pitchFamily="34" charset="0"/>
+                <a:cs typeface="Open Sans" panose="020B0606030504020204" pitchFamily="34" charset="0"/>
+              </a:rPr>
+              <a:t>  </a:t>
             </a:r>
           </a:p>
         </p:txBody>
@@ -3886,7 +3895,7 @@
         <p:spPr>
           <a:xfrm>
             <a:off x="1515035" y="11217105"/>
-            <a:ext cx="2303836" cy="461665"/>
+            <a:ext cx="22068865" cy="1384995"/>
           </a:xfrm>
           <a:prstGeom prst="rect">
             <a:avLst/>
@@ -3894,7 +3903,7 @@
           <a:noFill/>
         </p:spPr>
         <p:txBody>
-          <a:bodyPr wrap="none" rtlCol="0">
+          <a:bodyPr wrap="square" rtlCol="0">
             <a:spAutoFit/>
           </a:bodyPr>
           <a:lstStyle/>
@@ -3905,7 +3914,65 @@
                 <a:ea typeface="Open Sans" panose="020B0606030504020204" pitchFamily="34" charset="0"/>
                 <a:cs typeface="Open Sans" panose="020B0606030504020204" pitchFamily="34" charset="0"/>
               </a:rPr>
-              <a:t>Commentary:  </a:t>
+              <a:t>Commentary: </a:t>
+            </a:r>
+            <a:r>
+              <a:rPr lang="en-US" sz="2000" b="0" i="0" dirty="0">
+                <a:solidFill>
+                  <a:srgbClr val="000000"/>
+                </a:solidFill>
+                <a:effectLst/>
+                <a:latin typeface="Consolas" panose="020B0609020204030204" pitchFamily="49" charset="0"/>
+              </a:rPr>
+              <a:t>Whereas in this figure, once the population value is normalized, it portrays a more even allocation for all states with the exception of Utah and Alaska by percentage. We believe the reasoning is based on X. If the goal is to achieve vaccination for the entire population, the % value in the chart would equate to x%. The values are similar/same for Pfizer since the doses are automatically scheduled for you. </a:t>
+            </a:r>
+            <a:r>
+              <a:rPr lang="en-US" sz="2000" b="0" i="0" dirty="0" err="1">
+                <a:solidFill>
+                  <a:srgbClr val="000000"/>
+                </a:solidFill>
+                <a:effectLst/>
+                <a:latin typeface="Consolas" panose="020B0609020204030204" pitchFamily="49" charset="0"/>
+              </a:rPr>
+              <a:t>Maderna</a:t>
+            </a:r>
+            <a:r>
+              <a:rPr lang="en-US" sz="2000" b="0" i="0" dirty="0">
+                <a:solidFill>
+                  <a:srgbClr val="000000"/>
+                </a:solidFill>
+                <a:effectLst/>
+                <a:latin typeface="Consolas" panose="020B0609020204030204" pitchFamily="49" charset="0"/>
+              </a:rPr>
+              <a:t> has fewer shots (doses 1 &amp; 2) than Pfizer (doses 1 &amp; 2). Q:(1/3 should receive Pfizer, 1/3 </a:t>
+            </a:r>
+            <a:r>
+              <a:rPr lang="en-US" sz="2000" b="0" i="0" dirty="0" err="1">
+                <a:solidFill>
+                  <a:srgbClr val="000000"/>
+                </a:solidFill>
+                <a:effectLst/>
+                <a:latin typeface="Consolas" panose="020B0609020204030204" pitchFamily="49" charset="0"/>
+              </a:rPr>
+              <a:t>Moderna</a:t>
+            </a:r>
+            <a:r>
+              <a:rPr lang="en-US" sz="2000" b="0" i="0" dirty="0">
+                <a:solidFill>
+                  <a:srgbClr val="000000"/>
+                </a:solidFill>
+                <a:effectLst/>
+                <a:latin typeface="Consolas" panose="020B0609020204030204" pitchFamily="49" charset="0"/>
+              </a:rPr>
+              <a:t>, 1/3 J&amp;J)</a:t>
+            </a:r>
+            <a:r>
+              <a:rPr lang="en-US" sz="2000" dirty="0">
+                <a:latin typeface="Open Sans" panose="020B0606030504020204" pitchFamily="34" charset="0"/>
+                <a:ea typeface="Open Sans" panose="020B0606030504020204" pitchFamily="34" charset="0"/>
+                <a:cs typeface="Open Sans" panose="020B0606030504020204" pitchFamily="34" charset="0"/>
+              </a:rPr>
+              <a:t>  </a:t>
             </a:r>
           </a:p>
         </p:txBody>
@@ -3990,8 +4057,8 @@
         </p:nvSpPr>
         <p:spPr>
           <a:xfrm>
-            <a:off x="1515035" y="11217105"/>
-            <a:ext cx="2303836" cy="461665"/>
+            <a:off x="382167" y="1482555"/>
+            <a:ext cx="2761083" cy="8586966"/>
           </a:xfrm>
           <a:prstGeom prst="rect">
             <a:avLst/>
@@ -3999,7 +4066,7 @@
           <a:noFill/>
         </p:spPr>
         <p:txBody>
-          <a:bodyPr wrap="none" rtlCol="0">
+          <a:bodyPr wrap="square" rtlCol="0">
             <a:spAutoFit/>
           </a:bodyPr>
           <a:lstStyle/>
@@ -4010,17 +4077,85 @@
                 <a:ea typeface="Open Sans" panose="020B0606030504020204" pitchFamily="34" charset="0"/>
                 <a:cs typeface="Open Sans" panose="020B0606030504020204" pitchFamily="34" charset="0"/>
               </a:rPr>
-              <a:t>Commentary:  </a:t>
+              <a:t>Commentary:</a:t>
+            </a:r>
+            <a:r>
+              <a:rPr lang="en-US" sz="1800" b="0" i="0" dirty="0">
+                <a:solidFill>
+                  <a:srgbClr val="000000"/>
+                </a:solidFill>
+                <a:effectLst/>
+                <a:latin typeface="Consolas" panose="020B0609020204030204" pitchFamily="49" charset="0"/>
+              </a:rPr>
+              <a:t> Note, these images contain the number of total vaccines allocated by state. In figures 1 &amp; 2, you will notice the bars mirror each other due to the fact that the patient is automatically scheduled for the 2nd dose (Pfizer &amp; </a:t>
+            </a:r>
+            <a:r>
+              <a:rPr lang="en-US" sz="1800" b="0" i="0" dirty="0" err="1">
+                <a:solidFill>
+                  <a:srgbClr val="000000"/>
+                </a:solidFill>
+                <a:effectLst/>
+                <a:latin typeface="Consolas" panose="020B0609020204030204" pitchFamily="49" charset="0"/>
+              </a:rPr>
+              <a:t>Moderna</a:t>
+            </a:r>
+            <a:r>
+              <a:rPr lang="en-US" sz="1800" b="0" i="0" dirty="0">
+                <a:solidFill>
+                  <a:srgbClr val="000000"/>
+                </a:solidFill>
+                <a:effectLst/>
+                <a:latin typeface="Consolas" panose="020B0609020204030204" pitchFamily="49" charset="0"/>
+              </a:rPr>
+              <a:t>) at the time of receiving their first dose; hence the allocation for dose two is the same value as dose one. In the third figure, you only see one bar, since J&amp;J is a single dose vaccine. However, it appears that CA has received a higher number of doses of </a:t>
+            </a:r>
+            <a:r>
+              <a:rPr lang="en-US" sz="1800" b="0" i="0" dirty="0" err="1">
+                <a:solidFill>
+                  <a:srgbClr val="000000"/>
+                </a:solidFill>
+                <a:effectLst/>
+                <a:latin typeface="Consolas" panose="020B0609020204030204" pitchFamily="49" charset="0"/>
+              </a:rPr>
+              <a:t>Moderna</a:t>
+            </a:r>
+            <a:r>
+              <a:rPr lang="en-US" sz="1800" b="0" i="0" dirty="0">
+                <a:solidFill>
+                  <a:srgbClr val="000000"/>
+                </a:solidFill>
+                <a:effectLst/>
+                <a:latin typeface="Consolas" panose="020B0609020204030204" pitchFamily="49" charset="0"/>
+              </a:rPr>
+              <a:t> versus Pfizer and J&amp;J</a:t>
+            </a:r>
+            <a:r>
+              <a:rPr lang="en-US" sz="1200" b="0" i="0" dirty="0">
+                <a:solidFill>
+                  <a:srgbClr val="000000"/>
+                </a:solidFill>
+                <a:effectLst/>
+                <a:latin typeface="Consolas" panose="020B0609020204030204" pitchFamily="49" charset="0"/>
+              </a:rPr>
+              <a:t>.</a:t>
+            </a:r>
+            <a:r>
+              <a:rPr lang="en-US" sz="2400" dirty="0">
+                <a:latin typeface="Open Sans" panose="020B0606030504020204" pitchFamily="34" charset="0"/>
+                <a:ea typeface="Open Sans" panose="020B0606030504020204" pitchFamily="34" charset="0"/>
+                <a:cs typeface="Open Sans" panose="020B0606030504020204" pitchFamily="34" charset="0"/>
+              </a:rPr>
+              <a:t>  </a:t>
             </a:r>
           </a:p>
         </p:txBody>
       </p:sp>
       <p:pic>
         <p:nvPicPr>
-          <p:cNvPr id="5" name="Picture 4">
+          <p:cNvPr id="3" name="Picture 2">
             <a:extLst>
               <a:ext uri="{FF2B5EF4-FFF2-40B4-BE49-F238E27FC236}">
-                <a16:creationId xmlns:a16="http://schemas.microsoft.com/office/drawing/2014/main" id="{392A8263-F53D-48F7-B37C-CC73655E6ADA}"/>
+                <a16:creationId xmlns:a16="http://schemas.microsoft.com/office/drawing/2014/main" id="{E30A69E1-9AEA-4E5C-9BB9-74D052E78F0B}"/>
               </a:ext>
             </a:extLst>
           </p:cNvPr>
@@ -4030,15 +4165,21 @@
           <p:nvPr/>
         </p:nvPicPr>
         <p:blipFill>
-          <a:blip r:embed="rId2"/>
+          <a:blip r:embed="rId2">
+            <a:extLst>
+              <a:ext uri="{28A0092B-C50C-407E-A947-70E740481C1C}">
+                <a14:useLocalDpi xmlns:a14="http://schemas.microsoft.com/office/drawing/2010/main" val="0"/>
+              </a:ext>
+            </a:extLst>
+          </a:blip>
           <a:stretch>
             <a:fillRect/>
           </a:stretch>
         </p:blipFill>
         <p:spPr>
           <a:xfrm>
-            <a:off x="3902074" y="0"/>
-            <a:ext cx="16573501" cy="13716000"/>
+            <a:off x="1546225" y="-1162050"/>
+            <a:ext cx="21336000" cy="16001999"/>
           </a:xfrm>
           <a:prstGeom prst="rect">
             <a:avLst/>
@@ -5975,7 +6116,7 @@
         <p:spPr>
           <a:xfrm>
             <a:off x="1311275" y="5293947"/>
-            <a:ext cx="8787021" cy="1590179"/>
+            <a:ext cx="8998617" cy="1590179"/>
           </a:xfrm>
           <a:prstGeom prst="rect">
             <a:avLst/>
@@ -6515,7 +6656,14 @@
           </a:fontRef>
         </p:style>
         <p:txBody>
-          <a:bodyPr rtlCol="0" anchor="ctr"/>
+          <a:bodyPr rtlCol="0" anchor="ctr">
+            <a:scene3d>
+              <a:camera prst="orthographicFront">
+                <a:rot lat="0" lon="0" rev="5400000"/>
+              </a:camera>
+              <a:lightRig rig="threePt" dir="t"/>
+            </a:scene3d>
+          </a:bodyPr>
           <a:lstStyle/>
           <a:p>
             <a:pPr algn="ctr"/>
@@ -6931,8 +7079,8 @@
         </p:nvSpPr>
         <p:spPr>
           <a:xfrm>
-            <a:off x="8243678" y="580840"/>
-            <a:ext cx="7872412" cy="1107996"/>
+            <a:off x="8433153" y="580840"/>
+            <a:ext cx="7493462" cy="1107996"/>
           </a:xfrm>
           <a:prstGeom prst="rect">
             <a:avLst/>
@@ -6951,8 +7099,9 @@
                 <a:solidFill>
                   <a:schemeClr val="tx2"/>
                 </a:solidFill>
-                <a:latin typeface="Open Sans" panose="020B0606030504020204" pitchFamily="34" charset="0"/>
-                <a:cs typeface="Open Sans" panose="020B0606030504020204" pitchFamily="34" charset="0"/>
+                <a:latin typeface="Open Sans Light" panose="020B0306030504020204" pitchFamily="34" charset="0"/>
+                <a:ea typeface="Open Sans Light" panose="020B0306030504020204" pitchFamily="34" charset="0"/>
+                <a:cs typeface="Open Sans Light" panose="020B0306030504020204" pitchFamily="34" charset="0"/>
               </a:rPr>
               <a:t>Covid-19 Pandemic</a:t>
             </a:r>
@@ -17513,8 +17662,8 @@
         </p:nvSpPr>
         <p:spPr>
           <a:xfrm>
-            <a:off x="7937095" y="1183811"/>
-            <a:ext cx="7375545" cy="1138773"/>
+            <a:off x="7688437" y="1183811"/>
+            <a:ext cx="7872861" cy="1138773"/>
           </a:xfrm>
           <a:prstGeom prst="rect">
             <a:avLst/>
@@ -17533,8 +17682,9 @@
                 <a:solidFill>
                   <a:schemeClr val="tx2"/>
                 </a:solidFill>
-                <a:latin typeface="Open Sans" panose="020B0606030504020204" pitchFamily="34" charset="0"/>
-                <a:cs typeface="Open Sans" panose="020B0606030504020204" pitchFamily="34" charset="0"/>
+                <a:latin typeface="Open Sans Light" panose="020B0306030504020204" pitchFamily="34" charset="0"/>
+                <a:ea typeface="Open Sans Light" panose="020B0306030504020204" pitchFamily="34" charset="0"/>
+                <a:cs typeface="Open Sans Light" panose="020B0306030504020204" pitchFamily="34" charset="0"/>
               </a:rPr>
               <a:t>Vaccines Evaluated</a:t>
             </a:r>
@@ -23255,7 +23405,7 @@
         <p:spPr>
           <a:xfrm>
             <a:off x="6243832" y="3909366"/>
-            <a:ext cx="4409378" cy="644282"/>
+            <a:ext cx="4409378" cy="655246"/>
           </a:xfrm>
           <a:prstGeom prst="rect">
             <a:avLst/>
@@ -23448,7 +23598,29 @@
                 <a:ea typeface="Open Sans Light" panose="020B0306030504020204" pitchFamily="34" charset="0"/>
                 <a:cs typeface="Open Sans Light" panose="020B0306030504020204" pitchFamily="34" charset="0"/>
               </a:rPr>
-              <a:t>Pfizer, Maderna, and J&amp;J</a:t>
+              <a:t>Pfizer, </a:t>
+            </a:r>
+            <a:r>
+              <a:rPr lang="en-US" sz="2700" dirty="0" err="1">
+                <a:solidFill>
+                  <a:schemeClr val="tx1"/>
+                </a:solidFill>
+                <a:latin typeface="Open Sans Light" panose="020B0306030504020204" pitchFamily="34" charset="0"/>
+                <a:ea typeface="Open Sans Light" panose="020B0306030504020204" pitchFamily="34" charset="0"/>
+                <a:cs typeface="Open Sans Light" panose="020B0306030504020204" pitchFamily="34" charset="0"/>
+              </a:rPr>
+              <a:t>Moderna</a:t>
+            </a:r>
+            <a:r>
+              <a:rPr lang="en-US" sz="2700" dirty="0">
+                <a:solidFill>
+                  <a:schemeClr val="tx1"/>
+                </a:solidFill>
+                <a:latin typeface="Open Sans Light" panose="020B0306030504020204" pitchFamily="34" charset="0"/>
+                <a:ea typeface="Open Sans Light" panose="020B0306030504020204" pitchFamily="34" charset="0"/>
+                <a:cs typeface="Open Sans Light" panose="020B0306030504020204" pitchFamily="34" charset="0"/>
+              </a:rPr>
+              <a:t>, and J&amp;J</a:t>
             </a:r>
           </a:p>
         </p:txBody>
@@ -26313,8 +26485,8 @@
         </p:nvSpPr>
         <p:spPr>
           <a:xfrm>
-            <a:off x="3796794" y="734667"/>
-            <a:ext cx="6588343" cy="1138773"/>
+            <a:off x="3679615" y="734667"/>
+            <a:ext cx="6822702" cy="1138773"/>
           </a:xfrm>
           <a:prstGeom prst="rect">
             <a:avLst/>
@@ -26333,8 +26505,9 @@
                 <a:solidFill>
                   <a:schemeClr val="tx2"/>
                 </a:solidFill>
-                <a:latin typeface="Open Sans" panose="020B0606030504020204" pitchFamily="34" charset="0"/>
-                <a:cs typeface="Open Sans" panose="020B0606030504020204" pitchFamily="34" charset="0"/>
+                <a:latin typeface="Open Sans Light" panose="020B0306030504020204" pitchFamily="34" charset="0"/>
+                <a:ea typeface="Open Sans Light" panose="020B0306030504020204" pitchFamily="34" charset="0"/>
+                <a:cs typeface="Open Sans Light" panose="020B0306030504020204" pitchFamily="34" charset="0"/>
               </a:rPr>
               <a:t>Questions Posed</a:t>
             </a:r>
@@ -29768,7 +29941,7 @@
         <p:spPr bwMode="auto">
           <a:xfrm>
             <a:off x="2050494" y="4434259"/>
-            <a:ext cx="6907340" cy="1615827"/>
+            <a:ext cx="6545061" cy="1615827"/>
           </a:xfrm>
           <a:prstGeom prst="rect">
             <a:avLst/>
@@ -29809,9 +29982,9 @@
                 <a:solidFill>
                   <a:schemeClr val="tx2"/>
                 </a:solidFill>
-                <a:latin typeface="Open Sans" panose="020B0606030504020204" pitchFamily="34" charset="0"/>
-                <a:ea typeface="Open Sans" panose="020B0606030504020204" pitchFamily="34" charset="0"/>
-                <a:cs typeface="Open Sans" panose="020B0606030504020204" pitchFamily="34" charset="0"/>
+                <a:latin typeface="Open Sans Light" panose="020B0306030504020204" pitchFamily="34" charset="0"/>
+                <a:ea typeface="Open Sans Light" panose="020B0306030504020204" pitchFamily="34" charset="0"/>
+                <a:cs typeface="Open Sans Light" panose="020B0306030504020204" pitchFamily="34" charset="0"/>
                 <a:sym typeface="Bebas Neue" charset="0"/>
               </a:rPr>
               <a:t>Analysis</a:t>

</xml_diff>